<commit_message>
Add global filter and filters order
</commit_message>
<xml_diff>
--- a/Middleware&Filters.pptx
+++ b/Middleware&Filters.pptx
@@ -5,7 +5,7 @@
     <p:sldMasterId id="2147483648" r:id="rId1"/>
   </p:sldMasterIdLst>
   <p:notesMasterIdLst>
-    <p:notesMasterId r:id="rId63"/>
+    <p:notesMasterId r:id="rId73"/>
   </p:notesMasterIdLst>
   <p:sldIdLst>
     <p:sldId id="256" r:id="rId2"/>
@@ -69,6 +69,16 @@
     <p:sldId id="317" r:id="rId60"/>
     <p:sldId id="319" r:id="rId61"/>
     <p:sldId id="320" r:id="rId62"/>
+    <p:sldId id="322" r:id="rId63"/>
+    <p:sldId id="321" r:id="rId64"/>
+    <p:sldId id="323" r:id="rId65"/>
+    <p:sldId id="324" r:id="rId66"/>
+    <p:sldId id="325" r:id="rId67"/>
+    <p:sldId id="326" r:id="rId68"/>
+    <p:sldId id="327" r:id="rId69"/>
+    <p:sldId id="328" r:id="rId70"/>
+    <p:sldId id="329" r:id="rId71"/>
+    <p:sldId id="330" r:id="rId72"/>
   </p:sldIdLst>
   <p:sldSz cx="12192000" cy="6858000"/>
   <p:notesSz cx="6858000" cy="9144000"/>
@@ -257,7 +267,7 @@
           <a:p>
             <a:fld id="{1747B90C-FE49-44DE-93E7-FA9DDECBEA03}" type="datetimeFigureOut">
               <a:rPr lang="en-US" smtClean="0"/>
-              <a:t>09-Oct-19</a:t>
+              <a:t>10-Oct-19</a:t>
             </a:fld>
             <a:endParaRPr lang="en-US"/>
           </a:p>
@@ -3271,6 +3281,114 @@
 </p:notes>
 </file>
 
+<file path=ppt/notesSlides/notesSlide39.xml><?xml version="1.0" encoding="utf-8"?>
+<p:notes xmlns:a="http://schemas.openxmlformats.org/drawingml/2006/main" xmlns:r="http://schemas.openxmlformats.org/officeDocument/2006/relationships" xmlns:p="http://schemas.openxmlformats.org/presentationml/2006/main">
+  <p:cSld>
+    <p:spTree>
+      <p:nvGrpSpPr>
+        <p:cNvPr id="1" name=""/>
+        <p:cNvGrpSpPr/>
+        <p:nvPr/>
+      </p:nvGrpSpPr>
+      <p:grpSpPr>
+        <a:xfrm>
+          <a:off x="0" y="0"/>
+          <a:ext cx="0" cy="0"/>
+          <a:chOff x="0" y="0"/>
+          <a:chExt cx="0" cy="0"/>
+        </a:xfrm>
+      </p:grpSpPr>
+      <p:sp>
+        <p:nvSpPr>
+          <p:cNvPr id="2" name="Slide Image Placeholder 1"/>
+          <p:cNvSpPr>
+            <a:spLocks noGrp="1" noRot="1" noChangeAspect="1"/>
+          </p:cNvSpPr>
+          <p:nvPr>
+            <p:ph type="sldImg"/>
+          </p:nvPr>
+        </p:nvSpPr>
+        <p:spPr/>
+      </p:sp>
+      <p:sp>
+        <p:nvSpPr>
+          <p:cNvPr id="3" name="Notes Placeholder 2"/>
+          <p:cNvSpPr>
+            <a:spLocks noGrp="1"/>
+          </p:cNvSpPr>
+          <p:nvPr>
+            <p:ph type="body" idx="1"/>
+          </p:nvPr>
+        </p:nvSpPr>
+        <p:spPr/>
+        <p:txBody>
+          <a:bodyPr/>
+          <a:lstStyle/>
+          <a:p>
+            <a:r>
+              <a:rPr lang="ru-RU" dirty="0" smtClean="0"/>
+              <a:t>Аналог</a:t>
+            </a:r>
+            <a:r>
+              <a:rPr lang="ru-RU" baseline="0" dirty="0" smtClean="0"/>
+              <a:t> </a:t>
+            </a:r>
+            <a:r>
+              <a:rPr lang="en-US" baseline="0" dirty="0" smtClean="0"/>
+              <a:t>type </a:t>
+            </a:r>
+            <a:r>
+              <a:rPr lang="ru-RU" baseline="0" dirty="0" smtClean="0"/>
+              <a:t>и </a:t>
+            </a:r>
+            <a:r>
+              <a:rPr lang="en-US" baseline="0" dirty="0" smtClean="0"/>
+              <a:t>Service </a:t>
+            </a:r>
+            <a:r>
+              <a:rPr lang="ru-RU" baseline="0" dirty="0" smtClean="0"/>
+              <a:t>фильтров</a:t>
+            </a:r>
+            <a:endParaRPr lang="en-US" dirty="0"/>
+          </a:p>
+        </p:txBody>
+      </p:sp>
+      <p:sp>
+        <p:nvSpPr>
+          <p:cNvPr id="4" name="Slide Number Placeholder 3"/>
+          <p:cNvSpPr>
+            <a:spLocks noGrp="1"/>
+          </p:cNvSpPr>
+          <p:nvPr>
+            <p:ph type="sldNum" sz="quarter" idx="10"/>
+          </p:nvPr>
+        </p:nvSpPr>
+        <p:spPr/>
+        <p:txBody>
+          <a:bodyPr/>
+          <a:lstStyle/>
+          <a:p>
+            <a:fld id="{BA1D5B97-ACF5-4677-A104-92B2393AA446}" type="slidenum">
+              <a:rPr lang="en-US" smtClean="0"/>
+              <a:t>62</a:t>
+            </a:fld>
+            <a:endParaRPr lang="en-US"/>
+          </a:p>
+        </p:txBody>
+      </p:sp>
+    </p:spTree>
+    <p:extLst>
+      <p:ext uri="{BB962C8B-B14F-4D97-AF65-F5344CB8AC3E}">
+        <p14:creationId xmlns:p14="http://schemas.microsoft.com/office/powerpoint/2010/main" val="299886038"/>
+      </p:ext>
+    </p:extLst>
+  </p:cSld>
+  <p:clrMapOvr>
+    <a:masterClrMapping/>
+  </p:clrMapOvr>
+</p:notes>
+</file>
+
 <file path=ppt/notesSlides/notesSlide4.xml><?xml version="1.0" encoding="utf-8"?>
 <p:notes xmlns:a="http://schemas.openxmlformats.org/drawingml/2006/main" xmlns:r="http://schemas.openxmlformats.org/officeDocument/2006/relationships" xmlns:p="http://schemas.openxmlformats.org/presentationml/2006/main">
   <p:cSld>
@@ -3346,6 +3464,766 @@
     <p:extLst>
       <p:ext uri="{BB962C8B-B14F-4D97-AF65-F5344CB8AC3E}">
         <p14:creationId xmlns:p14="http://schemas.microsoft.com/office/powerpoint/2010/main" val="2804259370"/>
+      </p:ext>
+    </p:extLst>
+  </p:cSld>
+  <p:clrMapOvr>
+    <a:masterClrMapping/>
+  </p:clrMapOvr>
+</p:notes>
+</file>
+
+<file path=ppt/notesSlides/notesSlide40.xml><?xml version="1.0" encoding="utf-8"?>
+<p:notes xmlns:a="http://schemas.openxmlformats.org/drawingml/2006/main" xmlns:r="http://schemas.openxmlformats.org/officeDocument/2006/relationships" xmlns:p="http://schemas.openxmlformats.org/presentationml/2006/main">
+  <p:cSld>
+    <p:spTree>
+      <p:nvGrpSpPr>
+        <p:cNvPr id="1" name=""/>
+        <p:cNvGrpSpPr/>
+        <p:nvPr/>
+      </p:nvGrpSpPr>
+      <p:grpSpPr>
+        <a:xfrm>
+          <a:off x="0" y="0"/>
+          <a:ext cx="0" cy="0"/>
+          <a:chOff x="0" y="0"/>
+          <a:chExt cx="0" cy="0"/>
+        </a:xfrm>
+      </p:grpSpPr>
+      <p:sp>
+        <p:nvSpPr>
+          <p:cNvPr id="2" name="Slide Image Placeholder 1"/>
+          <p:cNvSpPr>
+            <a:spLocks noGrp="1" noRot="1" noChangeAspect="1"/>
+          </p:cNvSpPr>
+          <p:nvPr>
+            <p:ph type="sldImg"/>
+          </p:nvPr>
+        </p:nvSpPr>
+        <p:spPr/>
+      </p:sp>
+      <p:sp>
+        <p:nvSpPr>
+          <p:cNvPr id="3" name="Notes Placeholder 2"/>
+          <p:cNvSpPr>
+            <a:spLocks noGrp="1"/>
+          </p:cNvSpPr>
+          <p:nvPr>
+            <p:ph type="body" idx="1"/>
+          </p:nvPr>
+        </p:nvSpPr>
+        <p:spPr/>
+        <p:txBody>
+          <a:bodyPr/>
+          <a:lstStyle/>
+          <a:p>
+            <a:r>
+              <a:rPr lang="en-US" dirty="0" smtClean="0"/>
+              <a:t>No filters</a:t>
+            </a:r>
+            <a:endParaRPr lang="en-US" dirty="0"/>
+          </a:p>
+        </p:txBody>
+      </p:sp>
+      <p:sp>
+        <p:nvSpPr>
+          <p:cNvPr id="4" name="Slide Number Placeholder 3"/>
+          <p:cNvSpPr>
+            <a:spLocks noGrp="1"/>
+          </p:cNvSpPr>
+          <p:nvPr>
+            <p:ph type="sldNum" sz="quarter" idx="10"/>
+          </p:nvPr>
+        </p:nvSpPr>
+        <p:spPr/>
+        <p:txBody>
+          <a:bodyPr/>
+          <a:lstStyle/>
+          <a:p>
+            <a:fld id="{BA1D5B97-ACF5-4677-A104-92B2393AA446}" type="slidenum">
+              <a:rPr lang="en-US" smtClean="0"/>
+              <a:t>63</a:t>
+            </a:fld>
+            <a:endParaRPr lang="en-US"/>
+          </a:p>
+        </p:txBody>
+      </p:sp>
+    </p:spTree>
+    <p:extLst>
+      <p:ext uri="{BB962C8B-B14F-4D97-AF65-F5344CB8AC3E}">
+        <p14:creationId xmlns:p14="http://schemas.microsoft.com/office/powerpoint/2010/main" val="657862575"/>
+      </p:ext>
+    </p:extLst>
+  </p:cSld>
+  <p:clrMapOvr>
+    <a:masterClrMapping/>
+  </p:clrMapOvr>
+</p:notes>
+</file>
+
+<file path=ppt/notesSlides/notesSlide41.xml><?xml version="1.0" encoding="utf-8"?>
+<p:notes xmlns:a="http://schemas.openxmlformats.org/drawingml/2006/main" xmlns:r="http://schemas.openxmlformats.org/officeDocument/2006/relationships" xmlns:p="http://schemas.openxmlformats.org/presentationml/2006/main">
+  <p:cSld>
+    <p:spTree>
+      <p:nvGrpSpPr>
+        <p:cNvPr id="1" name=""/>
+        <p:cNvGrpSpPr/>
+        <p:nvPr/>
+      </p:nvGrpSpPr>
+      <p:grpSpPr>
+        <a:xfrm>
+          <a:off x="0" y="0"/>
+          <a:ext cx="0" cy="0"/>
+          <a:chOff x="0" y="0"/>
+          <a:chExt cx="0" cy="0"/>
+        </a:xfrm>
+      </p:grpSpPr>
+      <p:sp>
+        <p:nvSpPr>
+          <p:cNvPr id="2" name="Slide Image Placeholder 1"/>
+          <p:cNvSpPr>
+            <a:spLocks noGrp="1" noRot="1" noChangeAspect="1"/>
+          </p:cNvSpPr>
+          <p:nvPr>
+            <p:ph type="sldImg"/>
+          </p:nvPr>
+        </p:nvSpPr>
+        <p:spPr/>
+      </p:sp>
+      <p:sp>
+        <p:nvSpPr>
+          <p:cNvPr id="3" name="Notes Placeholder 2"/>
+          <p:cNvSpPr>
+            <a:spLocks noGrp="1"/>
+          </p:cNvSpPr>
+          <p:nvPr>
+            <p:ph type="body" idx="1"/>
+          </p:nvPr>
+        </p:nvSpPr>
+        <p:spPr/>
+        <p:txBody>
+          <a:bodyPr/>
+          <a:lstStyle/>
+          <a:p>
+            <a:endParaRPr lang="en-US" dirty="0"/>
+          </a:p>
+        </p:txBody>
+      </p:sp>
+      <p:sp>
+        <p:nvSpPr>
+          <p:cNvPr id="4" name="Slide Number Placeholder 3"/>
+          <p:cNvSpPr>
+            <a:spLocks noGrp="1"/>
+          </p:cNvSpPr>
+          <p:nvPr>
+            <p:ph type="sldNum" sz="quarter" idx="10"/>
+          </p:nvPr>
+        </p:nvSpPr>
+        <p:spPr/>
+        <p:txBody>
+          <a:bodyPr/>
+          <a:lstStyle/>
+          <a:p>
+            <a:fld id="{BA1D5B97-ACF5-4677-A104-92B2393AA446}" type="slidenum">
+              <a:rPr lang="en-US" smtClean="0"/>
+              <a:t>64</a:t>
+            </a:fld>
+            <a:endParaRPr lang="en-US"/>
+          </a:p>
+        </p:txBody>
+      </p:sp>
+    </p:spTree>
+    <p:extLst>
+      <p:ext uri="{BB962C8B-B14F-4D97-AF65-F5344CB8AC3E}">
+        <p14:creationId xmlns:p14="http://schemas.microsoft.com/office/powerpoint/2010/main" val="2509044022"/>
+      </p:ext>
+    </p:extLst>
+  </p:cSld>
+  <p:clrMapOvr>
+    <a:masterClrMapping/>
+  </p:clrMapOvr>
+</p:notes>
+</file>
+
+<file path=ppt/notesSlides/notesSlide42.xml><?xml version="1.0" encoding="utf-8"?>
+<p:notes xmlns:a="http://schemas.openxmlformats.org/drawingml/2006/main" xmlns:r="http://schemas.openxmlformats.org/officeDocument/2006/relationships" xmlns:p="http://schemas.openxmlformats.org/presentationml/2006/main">
+  <p:cSld>
+    <p:spTree>
+      <p:nvGrpSpPr>
+        <p:cNvPr id="1" name=""/>
+        <p:cNvGrpSpPr/>
+        <p:nvPr/>
+      </p:nvGrpSpPr>
+      <p:grpSpPr>
+        <a:xfrm>
+          <a:off x="0" y="0"/>
+          <a:ext cx="0" cy="0"/>
+          <a:chOff x="0" y="0"/>
+          <a:chExt cx="0" cy="0"/>
+        </a:xfrm>
+      </p:grpSpPr>
+      <p:sp>
+        <p:nvSpPr>
+          <p:cNvPr id="2" name="Slide Image Placeholder 1"/>
+          <p:cNvSpPr>
+            <a:spLocks noGrp="1" noRot="1" noChangeAspect="1"/>
+          </p:cNvSpPr>
+          <p:nvPr>
+            <p:ph type="sldImg"/>
+          </p:nvPr>
+        </p:nvSpPr>
+        <p:spPr/>
+      </p:sp>
+      <p:sp>
+        <p:nvSpPr>
+          <p:cNvPr id="3" name="Notes Placeholder 2"/>
+          <p:cNvSpPr>
+            <a:spLocks noGrp="1"/>
+          </p:cNvSpPr>
+          <p:nvPr>
+            <p:ph type="body" idx="1"/>
+          </p:nvPr>
+        </p:nvSpPr>
+        <p:spPr/>
+        <p:txBody>
+          <a:bodyPr/>
+          <a:lstStyle/>
+          <a:p>
+            <a:endParaRPr lang="en-US" dirty="0"/>
+          </a:p>
+        </p:txBody>
+      </p:sp>
+      <p:sp>
+        <p:nvSpPr>
+          <p:cNvPr id="4" name="Slide Number Placeholder 3"/>
+          <p:cNvSpPr>
+            <a:spLocks noGrp="1"/>
+          </p:cNvSpPr>
+          <p:nvPr>
+            <p:ph type="sldNum" sz="quarter" idx="10"/>
+          </p:nvPr>
+        </p:nvSpPr>
+        <p:spPr/>
+        <p:txBody>
+          <a:bodyPr/>
+          <a:lstStyle/>
+          <a:p>
+            <a:fld id="{BA1D5B97-ACF5-4677-A104-92B2393AA446}" type="slidenum">
+              <a:rPr lang="en-US" smtClean="0"/>
+              <a:t>65</a:t>
+            </a:fld>
+            <a:endParaRPr lang="en-US"/>
+          </a:p>
+        </p:txBody>
+      </p:sp>
+    </p:spTree>
+    <p:extLst>
+      <p:ext uri="{BB962C8B-B14F-4D97-AF65-F5344CB8AC3E}">
+        <p14:creationId xmlns:p14="http://schemas.microsoft.com/office/powerpoint/2010/main" val="2676055105"/>
+      </p:ext>
+    </p:extLst>
+  </p:cSld>
+  <p:clrMapOvr>
+    <a:masterClrMapping/>
+  </p:clrMapOvr>
+</p:notes>
+</file>
+
+<file path=ppt/notesSlides/notesSlide43.xml><?xml version="1.0" encoding="utf-8"?>
+<p:notes xmlns:a="http://schemas.openxmlformats.org/drawingml/2006/main" xmlns:r="http://schemas.openxmlformats.org/officeDocument/2006/relationships" xmlns:p="http://schemas.openxmlformats.org/presentationml/2006/main">
+  <p:cSld>
+    <p:spTree>
+      <p:nvGrpSpPr>
+        <p:cNvPr id="1" name=""/>
+        <p:cNvGrpSpPr/>
+        <p:nvPr/>
+      </p:nvGrpSpPr>
+      <p:grpSpPr>
+        <a:xfrm>
+          <a:off x="0" y="0"/>
+          <a:ext cx="0" cy="0"/>
+          <a:chOff x="0" y="0"/>
+          <a:chExt cx="0" cy="0"/>
+        </a:xfrm>
+      </p:grpSpPr>
+      <p:sp>
+        <p:nvSpPr>
+          <p:cNvPr id="2" name="Slide Image Placeholder 1"/>
+          <p:cNvSpPr>
+            <a:spLocks noGrp="1" noRot="1" noChangeAspect="1"/>
+          </p:cNvSpPr>
+          <p:nvPr>
+            <p:ph type="sldImg"/>
+          </p:nvPr>
+        </p:nvSpPr>
+        <p:spPr/>
+      </p:sp>
+      <p:sp>
+        <p:nvSpPr>
+          <p:cNvPr id="3" name="Notes Placeholder 2"/>
+          <p:cNvSpPr>
+            <a:spLocks noGrp="1"/>
+          </p:cNvSpPr>
+          <p:nvPr>
+            <p:ph type="body" idx="1"/>
+          </p:nvPr>
+        </p:nvSpPr>
+        <p:spPr/>
+        <p:txBody>
+          <a:bodyPr/>
+          <a:lstStyle/>
+          <a:p>
+            <a:endParaRPr lang="en-US" dirty="0"/>
+          </a:p>
+        </p:txBody>
+      </p:sp>
+      <p:sp>
+        <p:nvSpPr>
+          <p:cNvPr id="4" name="Slide Number Placeholder 3"/>
+          <p:cNvSpPr>
+            <a:spLocks noGrp="1"/>
+          </p:cNvSpPr>
+          <p:nvPr>
+            <p:ph type="sldNum" sz="quarter" idx="10"/>
+          </p:nvPr>
+        </p:nvSpPr>
+        <p:spPr/>
+        <p:txBody>
+          <a:bodyPr/>
+          <a:lstStyle/>
+          <a:p>
+            <a:fld id="{BA1D5B97-ACF5-4677-A104-92B2393AA446}" type="slidenum">
+              <a:rPr lang="en-US" smtClean="0"/>
+              <a:t>66</a:t>
+            </a:fld>
+            <a:endParaRPr lang="en-US"/>
+          </a:p>
+        </p:txBody>
+      </p:sp>
+    </p:spTree>
+    <p:extLst>
+      <p:ext uri="{BB962C8B-B14F-4D97-AF65-F5344CB8AC3E}">
+        <p14:creationId xmlns:p14="http://schemas.microsoft.com/office/powerpoint/2010/main" val="1726687750"/>
+      </p:ext>
+    </p:extLst>
+  </p:cSld>
+  <p:clrMapOvr>
+    <a:masterClrMapping/>
+  </p:clrMapOvr>
+</p:notes>
+</file>
+
+<file path=ppt/notesSlides/notesSlide44.xml><?xml version="1.0" encoding="utf-8"?>
+<p:notes xmlns:a="http://schemas.openxmlformats.org/drawingml/2006/main" xmlns:r="http://schemas.openxmlformats.org/officeDocument/2006/relationships" xmlns:p="http://schemas.openxmlformats.org/presentationml/2006/main">
+  <p:cSld>
+    <p:spTree>
+      <p:nvGrpSpPr>
+        <p:cNvPr id="1" name=""/>
+        <p:cNvGrpSpPr/>
+        <p:nvPr/>
+      </p:nvGrpSpPr>
+      <p:grpSpPr>
+        <a:xfrm>
+          <a:off x="0" y="0"/>
+          <a:ext cx="0" cy="0"/>
+          <a:chOff x="0" y="0"/>
+          <a:chExt cx="0" cy="0"/>
+        </a:xfrm>
+      </p:grpSpPr>
+      <p:sp>
+        <p:nvSpPr>
+          <p:cNvPr id="2" name="Slide Image Placeholder 1"/>
+          <p:cNvSpPr>
+            <a:spLocks noGrp="1" noRot="1" noChangeAspect="1"/>
+          </p:cNvSpPr>
+          <p:nvPr>
+            <p:ph type="sldImg"/>
+          </p:nvPr>
+        </p:nvSpPr>
+        <p:spPr/>
+      </p:sp>
+      <p:sp>
+        <p:nvSpPr>
+          <p:cNvPr id="3" name="Notes Placeholder 2"/>
+          <p:cNvSpPr>
+            <a:spLocks noGrp="1"/>
+          </p:cNvSpPr>
+          <p:nvPr>
+            <p:ph type="body" idx="1"/>
+          </p:nvPr>
+        </p:nvSpPr>
+        <p:spPr/>
+        <p:txBody>
+          <a:bodyPr/>
+          <a:lstStyle/>
+          <a:p>
+            <a:endParaRPr lang="en-US" dirty="0"/>
+          </a:p>
+        </p:txBody>
+      </p:sp>
+      <p:sp>
+        <p:nvSpPr>
+          <p:cNvPr id="4" name="Slide Number Placeholder 3"/>
+          <p:cNvSpPr>
+            <a:spLocks noGrp="1"/>
+          </p:cNvSpPr>
+          <p:nvPr>
+            <p:ph type="sldNum" sz="quarter" idx="10"/>
+          </p:nvPr>
+        </p:nvSpPr>
+        <p:spPr/>
+        <p:txBody>
+          <a:bodyPr/>
+          <a:lstStyle/>
+          <a:p>
+            <a:fld id="{BA1D5B97-ACF5-4677-A104-92B2393AA446}" type="slidenum">
+              <a:rPr lang="en-US" smtClean="0"/>
+              <a:t>67</a:t>
+            </a:fld>
+            <a:endParaRPr lang="en-US"/>
+          </a:p>
+        </p:txBody>
+      </p:sp>
+    </p:spTree>
+    <p:extLst>
+      <p:ext uri="{BB962C8B-B14F-4D97-AF65-F5344CB8AC3E}">
+        <p14:creationId xmlns:p14="http://schemas.microsoft.com/office/powerpoint/2010/main" val="2687915872"/>
+      </p:ext>
+    </p:extLst>
+  </p:cSld>
+  <p:clrMapOvr>
+    <a:masterClrMapping/>
+  </p:clrMapOvr>
+</p:notes>
+</file>
+
+<file path=ppt/notesSlides/notesSlide45.xml><?xml version="1.0" encoding="utf-8"?>
+<p:notes xmlns:a="http://schemas.openxmlformats.org/drawingml/2006/main" xmlns:r="http://schemas.openxmlformats.org/officeDocument/2006/relationships" xmlns:p="http://schemas.openxmlformats.org/presentationml/2006/main">
+  <p:cSld>
+    <p:spTree>
+      <p:nvGrpSpPr>
+        <p:cNvPr id="1" name=""/>
+        <p:cNvGrpSpPr/>
+        <p:nvPr/>
+      </p:nvGrpSpPr>
+      <p:grpSpPr>
+        <a:xfrm>
+          <a:off x="0" y="0"/>
+          <a:ext cx="0" cy="0"/>
+          <a:chOff x="0" y="0"/>
+          <a:chExt cx="0" cy="0"/>
+        </a:xfrm>
+      </p:grpSpPr>
+      <p:sp>
+        <p:nvSpPr>
+          <p:cNvPr id="2" name="Slide Image Placeholder 1"/>
+          <p:cNvSpPr>
+            <a:spLocks noGrp="1" noRot="1" noChangeAspect="1"/>
+          </p:cNvSpPr>
+          <p:nvPr>
+            <p:ph type="sldImg"/>
+          </p:nvPr>
+        </p:nvSpPr>
+        <p:spPr/>
+      </p:sp>
+      <p:sp>
+        <p:nvSpPr>
+          <p:cNvPr id="3" name="Notes Placeholder 2"/>
+          <p:cNvSpPr>
+            <a:spLocks noGrp="1"/>
+          </p:cNvSpPr>
+          <p:nvPr>
+            <p:ph type="body" idx="1"/>
+          </p:nvPr>
+        </p:nvSpPr>
+        <p:spPr/>
+        <p:txBody>
+          <a:bodyPr/>
+          <a:lstStyle/>
+          <a:p>
+            <a:endParaRPr lang="en-US" dirty="0"/>
+          </a:p>
+        </p:txBody>
+      </p:sp>
+      <p:sp>
+        <p:nvSpPr>
+          <p:cNvPr id="4" name="Slide Number Placeholder 3"/>
+          <p:cNvSpPr>
+            <a:spLocks noGrp="1"/>
+          </p:cNvSpPr>
+          <p:nvPr>
+            <p:ph type="sldNum" sz="quarter" idx="10"/>
+          </p:nvPr>
+        </p:nvSpPr>
+        <p:spPr/>
+        <p:txBody>
+          <a:bodyPr/>
+          <a:lstStyle/>
+          <a:p>
+            <a:fld id="{BA1D5B97-ACF5-4677-A104-92B2393AA446}" type="slidenum">
+              <a:rPr lang="en-US" smtClean="0"/>
+              <a:t>68</a:t>
+            </a:fld>
+            <a:endParaRPr lang="en-US"/>
+          </a:p>
+        </p:txBody>
+      </p:sp>
+    </p:spTree>
+    <p:extLst>
+      <p:ext uri="{BB962C8B-B14F-4D97-AF65-F5344CB8AC3E}">
+        <p14:creationId xmlns:p14="http://schemas.microsoft.com/office/powerpoint/2010/main" val="1406579775"/>
+      </p:ext>
+    </p:extLst>
+  </p:cSld>
+  <p:clrMapOvr>
+    <a:masterClrMapping/>
+  </p:clrMapOvr>
+</p:notes>
+</file>
+
+<file path=ppt/notesSlides/notesSlide46.xml><?xml version="1.0" encoding="utf-8"?>
+<p:notes xmlns:a="http://schemas.openxmlformats.org/drawingml/2006/main" xmlns:r="http://schemas.openxmlformats.org/officeDocument/2006/relationships" xmlns:p="http://schemas.openxmlformats.org/presentationml/2006/main">
+  <p:cSld>
+    <p:spTree>
+      <p:nvGrpSpPr>
+        <p:cNvPr id="1" name=""/>
+        <p:cNvGrpSpPr/>
+        <p:nvPr/>
+      </p:nvGrpSpPr>
+      <p:grpSpPr>
+        <a:xfrm>
+          <a:off x="0" y="0"/>
+          <a:ext cx="0" cy="0"/>
+          <a:chOff x="0" y="0"/>
+          <a:chExt cx="0" cy="0"/>
+        </a:xfrm>
+      </p:grpSpPr>
+      <p:sp>
+        <p:nvSpPr>
+          <p:cNvPr id="2" name="Slide Image Placeholder 1"/>
+          <p:cNvSpPr>
+            <a:spLocks noGrp="1" noRot="1" noChangeAspect="1"/>
+          </p:cNvSpPr>
+          <p:nvPr>
+            <p:ph type="sldImg"/>
+          </p:nvPr>
+        </p:nvSpPr>
+        <p:spPr/>
+      </p:sp>
+      <p:sp>
+        <p:nvSpPr>
+          <p:cNvPr id="3" name="Notes Placeholder 2"/>
+          <p:cNvSpPr>
+            <a:spLocks noGrp="1"/>
+          </p:cNvSpPr>
+          <p:nvPr>
+            <p:ph type="body" idx="1"/>
+          </p:nvPr>
+        </p:nvSpPr>
+        <p:spPr/>
+        <p:txBody>
+          <a:bodyPr/>
+          <a:lstStyle/>
+          <a:p>
+            <a:endParaRPr lang="en-US" dirty="0"/>
+          </a:p>
+        </p:txBody>
+      </p:sp>
+      <p:sp>
+        <p:nvSpPr>
+          <p:cNvPr id="4" name="Slide Number Placeholder 3"/>
+          <p:cNvSpPr>
+            <a:spLocks noGrp="1"/>
+          </p:cNvSpPr>
+          <p:nvPr>
+            <p:ph type="sldNum" sz="quarter" idx="10"/>
+          </p:nvPr>
+        </p:nvSpPr>
+        <p:spPr/>
+        <p:txBody>
+          <a:bodyPr/>
+          <a:lstStyle/>
+          <a:p>
+            <a:fld id="{BA1D5B97-ACF5-4677-A104-92B2393AA446}" type="slidenum">
+              <a:rPr lang="en-US" smtClean="0"/>
+              <a:t>69</a:t>
+            </a:fld>
+            <a:endParaRPr lang="en-US"/>
+          </a:p>
+        </p:txBody>
+      </p:sp>
+    </p:spTree>
+    <p:extLst>
+      <p:ext uri="{BB962C8B-B14F-4D97-AF65-F5344CB8AC3E}">
+        <p14:creationId xmlns:p14="http://schemas.microsoft.com/office/powerpoint/2010/main" val="3544279910"/>
+      </p:ext>
+    </p:extLst>
+  </p:cSld>
+  <p:clrMapOvr>
+    <a:masterClrMapping/>
+  </p:clrMapOvr>
+</p:notes>
+</file>
+
+<file path=ppt/notesSlides/notesSlide47.xml><?xml version="1.0" encoding="utf-8"?>
+<p:notes xmlns:a="http://schemas.openxmlformats.org/drawingml/2006/main" xmlns:r="http://schemas.openxmlformats.org/officeDocument/2006/relationships" xmlns:p="http://schemas.openxmlformats.org/presentationml/2006/main">
+  <p:cSld>
+    <p:spTree>
+      <p:nvGrpSpPr>
+        <p:cNvPr id="1" name=""/>
+        <p:cNvGrpSpPr/>
+        <p:nvPr/>
+      </p:nvGrpSpPr>
+      <p:grpSpPr>
+        <a:xfrm>
+          <a:off x="0" y="0"/>
+          <a:ext cx="0" cy="0"/>
+          <a:chOff x="0" y="0"/>
+          <a:chExt cx="0" cy="0"/>
+        </a:xfrm>
+      </p:grpSpPr>
+      <p:sp>
+        <p:nvSpPr>
+          <p:cNvPr id="2" name="Slide Image Placeholder 1"/>
+          <p:cNvSpPr>
+            <a:spLocks noGrp="1" noRot="1" noChangeAspect="1"/>
+          </p:cNvSpPr>
+          <p:nvPr>
+            <p:ph type="sldImg"/>
+          </p:nvPr>
+        </p:nvSpPr>
+        <p:spPr/>
+      </p:sp>
+      <p:sp>
+        <p:nvSpPr>
+          <p:cNvPr id="3" name="Notes Placeholder 2"/>
+          <p:cNvSpPr>
+            <a:spLocks noGrp="1"/>
+          </p:cNvSpPr>
+          <p:nvPr>
+            <p:ph type="body" idx="1"/>
+          </p:nvPr>
+        </p:nvSpPr>
+        <p:spPr/>
+        <p:txBody>
+          <a:bodyPr/>
+          <a:lstStyle/>
+          <a:p>
+            <a:endParaRPr lang="en-US" dirty="0"/>
+          </a:p>
+        </p:txBody>
+      </p:sp>
+      <p:sp>
+        <p:nvSpPr>
+          <p:cNvPr id="4" name="Slide Number Placeholder 3"/>
+          <p:cNvSpPr>
+            <a:spLocks noGrp="1"/>
+          </p:cNvSpPr>
+          <p:nvPr>
+            <p:ph type="sldNum" sz="quarter" idx="10"/>
+          </p:nvPr>
+        </p:nvSpPr>
+        <p:spPr/>
+        <p:txBody>
+          <a:bodyPr/>
+          <a:lstStyle/>
+          <a:p>
+            <a:fld id="{BA1D5B97-ACF5-4677-A104-92B2393AA446}" type="slidenum">
+              <a:rPr lang="en-US" smtClean="0"/>
+              <a:t>70</a:t>
+            </a:fld>
+            <a:endParaRPr lang="en-US"/>
+          </a:p>
+        </p:txBody>
+      </p:sp>
+    </p:spTree>
+    <p:extLst>
+      <p:ext uri="{BB962C8B-B14F-4D97-AF65-F5344CB8AC3E}">
+        <p14:creationId xmlns:p14="http://schemas.microsoft.com/office/powerpoint/2010/main" val="1197403115"/>
+      </p:ext>
+    </p:extLst>
+  </p:cSld>
+  <p:clrMapOvr>
+    <a:masterClrMapping/>
+  </p:clrMapOvr>
+</p:notes>
+</file>
+
+<file path=ppt/notesSlides/notesSlide48.xml><?xml version="1.0" encoding="utf-8"?>
+<p:notes xmlns:a="http://schemas.openxmlformats.org/drawingml/2006/main" xmlns:r="http://schemas.openxmlformats.org/officeDocument/2006/relationships" xmlns:p="http://schemas.openxmlformats.org/presentationml/2006/main">
+  <p:cSld>
+    <p:spTree>
+      <p:nvGrpSpPr>
+        <p:cNvPr id="1" name=""/>
+        <p:cNvGrpSpPr/>
+        <p:nvPr/>
+      </p:nvGrpSpPr>
+      <p:grpSpPr>
+        <a:xfrm>
+          <a:off x="0" y="0"/>
+          <a:ext cx="0" cy="0"/>
+          <a:chOff x="0" y="0"/>
+          <a:chExt cx="0" cy="0"/>
+        </a:xfrm>
+      </p:grpSpPr>
+      <p:sp>
+        <p:nvSpPr>
+          <p:cNvPr id="2" name="Slide Image Placeholder 1"/>
+          <p:cNvSpPr>
+            <a:spLocks noGrp="1" noRot="1" noChangeAspect="1"/>
+          </p:cNvSpPr>
+          <p:nvPr>
+            <p:ph type="sldImg"/>
+          </p:nvPr>
+        </p:nvSpPr>
+        <p:spPr/>
+      </p:sp>
+      <p:sp>
+        <p:nvSpPr>
+          <p:cNvPr id="3" name="Notes Placeholder 2"/>
+          <p:cNvSpPr>
+            <a:spLocks noGrp="1"/>
+          </p:cNvSpPr>
+          <p:nvPr>
+            <p:ph type="body" idx="1"/>
+          </p:nvPr>
+        </p:nvSpPr>
+        <p:spPr/>
+        <p:txBody>
+          <a:bodyPr/>
+          <a:lstStyle/>
+          <a:p>
+            <a:endParaRPr lang="en-US" dirty="0"/>
+          </a:p>
+        </p:txBody>
+      </p:sp>
+      <p:sp>
+        <p:nvSpPr>
+          <p:cNvPr id="4" name="Slide Number Placeholder 3"/>
+          <p:cNvSpPr>
+            <a:spLocks noGrp="1"/>
+          </p:cNvSpPr>
+          <p:nvPr>
+            <p:ph type="sldNum" sz="quarter" idx="10"/>
+          </p:nvPr>
+        </p:nvSpPr>
+        <p:spPr/>
+        <p:txBody>
+          <a:bodyPr/>
+          <a:lstStyle/>
+          <a:p>
+            <a:fld id="{BA1D5B97-ACF5-4677-A104-92B2393AA446}" type="slidenum">
+              <a:rPr lang="en-US" smtClean="0"/>
+              <a:t>71</a:t>
+            </a:fld>
+            <a:endParaRPr lang="en-US"/>
+          </a:p>
+        </p:txBody>
+      </p:sp>
+    </p:spTree>
+    <p:extLst>
+      <p:ext uri="{BB962C8B-B14F-4D97-AF65-F5344CB8AC3E}">
+        <p14:creationId xmlns:p14="http://schemas.microsoft.com/office/powerpoint/2010/main" val="515334132"/>
       </p:ext>
     </p:extLst>
   </p:cSld>
@@ -3906,7 +4784,7 @@
           <a:p>
             <a:fld id="{622E22BE-79DE-4FFF-A515-BF1CA8DF801A}" type="datetimeFigureOut">
               <a:rPr lang="en-US" smtClean="0"/>
-              <a:t>09-Oct-19</a:t>
+              <a:t>10-Oct-19</a:t>
             </a:fld>
             <a:endParaRPr lang="en-US"/>
           </a:p>
@@ -4076,7 +4954,7 @@
           <a:p>
             <a:fld id="{622E22BE-79DE-4FFF-A515-BF1CA8DF801A}" type="datetimeFigureOut">
               <a:rPr lang="en-US" smtClean="0"/>
-              <a:t>09-Oct-19</a:t>
+              <a:t>10-Oct-19</a:t>
             </a:fld>
             <a:endParaRPr lang="en-US"/>
           </a:p>
@@ -4256,7 +5134,7 @@
           <a:p>
             <a:fld id="{622E22BE-79DE-4FFF-A515-BF1CA8DF801A}" type="datetimeFigureOut">
               <a:rPr lang="en-US" smtClean="0"/>
-              <a:t>09-Oct-19</a:t>
+              <a:t>10-Oct-19</a:t>
             </a:fld>
             <a:endParaRPr lang="en-US"/>
           </a:p>
@@ -4426,7 +5304,7 @@
           <a:p>
             <a:fld id="{622E22BE-79DE-4FFF-A515-BF1CA8DF801A}" type="datetimeFigureOut">
               <a:rPr lang="en-US" smtClean="0"/>
-              <a:t>09-Oct-19</a:t>
+              <a:t>10-Oct-19</a:t>
             </a:fld>
             <a:endParaRPr lang="en-US"/>
           </a:p>
@@ -4672,7 +5550,7 @@
           <a:p>
             <a:fld id="{622E22BE-79DE-4FFF-A515-BF1CA8DF801A}" type="datetimeFigureOut">
               <a:rPr lang="en-US" smtClean="0"/>
-              <a:t>09-Oct-19</a:t>
+              <a:t>10-Oct-19</a:t>
             </a:fld>
             <a:endParaRPr lang="en-US"/>
           </a:p>
@@ -4904,7 +5782,7 @@
           <a:p>
             <a:fld id="{622E22BE-79DE-4FFF-A515-BF1CA8DF801A}" type="datetimeFigureOut">
               <a:rPr lang="en-US" smtClean="0"/>
-              <a:t>09-Oct-19</a:t>
+              <a:t>10-Oct-19</a:t>
             </a:fld>
             <a:endParaRPr lang="en-US"/>
           </a:p>
@@ -5271,7 +6149,7 @@
           <a:p>
             <a:fld id="{622E22BE-79DE-4FFF-A515-BF1CA8DF801A}" type="datetimeFigureOut">
               <a:rPr lang="en-US" smtClean="0"/>
-              <a:t>09-Oct-19</a:t>
+              <a:t>10-Oct-19</a:t>
             </a:fld>
             <a:endParaRPr lang="en-US"/>
           </a:p>
@@ -5389,7 +6267,7 @@
           <a:p>
             <a:fld id="{622E22BE-79DE-4FFF-A515-BF1CA8DF801A}" type="datetimeFigureOut">
               <a:rPr lang="en-US" smtClean="0"/>
-              <a:t>09-Oct-19</a:t>
+              <a:t>10-Oct-19</a:t>
             </a:fld>
             <a:endParaRPr lang="en-US"/>
           </a:p>
@@ -5484,7 +6362,7 @@
           <a:p>
             <a:fld id="{622E22BE-79DE-4FFF-A515-BF1CA8DF801A}" type="datetimeFigureOut">
               <a:rPr lang="en-US" smtClean="0"/>
-              <a:t>09-Oct-19</a:t>
+              <a:t>10-Oct-19</a:t>
             </a:fld>
             <a:endParaRPr lang="en-US"/>
           </a:p>
@@ -5761,7 +6639,7 @@
           <a:p>
             <a:fld id="{622E22BE-79DE-4FFF-A515-BF1CA8DF801A}" type="datetimeFigureOut">
               <a:rPr lang="en-US" smtClean="0"/>
-              <a:t>09-Oct-19</a:t>
+              <a:t>10-Oct-19</a:t>
             </a:fld>
             <a:endParaRPr lang="en-US"/>
           </a:p>
@@ -6014,7 +6892,7 @@
           <a:p>
             <a:fld id="{622E22BE-79DE-4FFF-A515-BF1CA8DF801A}" type="datetimeFigureOut">
               <a:rPr lang="en-US" smtClean="0"/>
-              <a:t>09-Oct-19</a:t>
+              <a:t>10-Oct-19</a:t>
             </a:fld>
             <a:endParaRPr lang="en-US"/>
           </a:p>
@@ -6227,7 +7105,7 @@
           <a:p>
             <a:fld id="{622E22BE-79DE-4FFF-A515-BF1CA8DF801A}" type="datetimeFigureOut">
               <a:rPr lang="en-US" smtClean="0"/>
-              <a:t>09-Oct-19</a:t>
+              <a:t>10-Oct-19</a:t>
             </a:fld>
             <a:endParaRPr lang="en-US"/>
           </a:p>
@@ -15102,7 +15980,6 @@
               <a:rPr lang="en-US" dirty="0"/>
               <a:t>)</a:t>
             </a:r>
-            <a:endParaRPr lang="en-US" dirty="0"/>
           </a:p>
         </p:txBody>
       </p:sp>
@@ -15233,7 +16110,6 @@
               <a:rPr lang="en-US" dirty="0"/>
               <a:t>)</a:t>
             </a:r>
-            <a:endParaRPr lang="en-US" dirty="0"/>
           </a:p>
         </p:txBody>
       </p:sp>
@@ -15781,6 +16657,1144 @@
 </p:sld>
 </file>
 
+<file path=ppt/slides/slide62.xml><?xml version="1.0" encoding="utf-8"?>
+<p:sld xmlns:a="http://schemas.openxmlformats.org/drawingml/2006/main" xmlns:r="http://schemas.openxmlformats.org/officeDocument/2006/relationships" xmlns:p="http://schemas.openxmlformats.org/presentationml/2006/main">
+  <p:cSld>
+    <p:bg>
+      <p:bgPr>
+        <a:gradFill>
+          <a:gsLst>
+            <a:gs pos="0">
+              <a:schemeClr val="accent1">
+                <a:lumMod val="5000"/>
+                <a:lumOff val="95000"/>
+              </a:schemeClr>
+            </a:gs>
+            <a:gs pos="42000">
+              <a:schemeClr val="accent1">
+                <a:lumMod val="45000"/>
+                <a:lumOff val="55000"/>
+              </a:schemeClr>
+            </a:gs>
+            <a:gs pos="83000">
+              <a:schemeClr val="accent1">
+                <a:lumMod val="45000"/>
+                <a:lumOff val="55000"/>
+              </a:schemeClr>
+            </a:gs>
+            <a:gs pos="100000">
+              <a:schemeClr val="accent1">
+                <a:lumMod val="30000"/>
+                <a:lumOff val="70000"/>
+              </a:schemeClr>
+            </a:gs>
+          </a:gsLst>
+          <a:lin ang="5400000" scaled="1"/>
+        </a:gradFill>
+        <a:effectLst/>
+      </p:bgPr>
+    </p:bg>
+    <p:spTree>
+      <p:nvGrpSpPr>
+        <p:cNvPr id="1" name=""/>
+        <p:cNvGrpSpPr/>
+        <p:nvPr/>
+      </p:nvGrpSpPr>
+      <p:grpSpPr>
+        <a:xfrm>
+          <a:off x="0" y="0"/>
+          <a:ext cx="0" cy="0"/>
+          <a:chOff x="0" y="0"/>
+          <a:chExt cx="0" cy="0"/>
+        </a:xfrm>
+      </p:grpSpPr>
+      <p:sp>
+        <p:nvSpPr>
+          <p:cNvPr id="2" name="Title 1"/>
+          <p:cNvSpPr>
+            <a:spLocks noGrp="1"/>
+          </p:cNvSpPr>
+          <p:nvPr>
+            <p:ph type="title"/>
+          </p:nvPr>
+        </p:nvSpPr>
+        <p:spPr>
+          <a:xfrm>
+            <a:off x="312821" y="-164575"/>
+            <a:ext cx="10515600" cy="1325563"/>
+          </a:xfrm>
+        </p:spPr>
+        <p:txBody>
+          <a:bodyPr/>
+          <a:lstStyle/>
+          <a:p>
+            <a:r>
+              <a:rPr lang="en-US" dirty="0" smtClean="0"/>
+              <a:t>Global filters</a:t>
+            </a:r>
+            <a:endParaRPr lang="en-US" dirty="0"/>
+          </a:p>
+        </p:txBody>
+      </p:sp>
+      <p:pic>
+        <p:nvPicPr>
+          <p:cNvPr id="3" name="Picture 2"/>
+          <p:cNvPicPr>
+            <a:picLocks noChangeAspect="1"/>
+          </p:cNvPicPr>
+          <p:nvPr/>
+        </p:nvPicPr>
+        <p:blipFill>
+          <a:blip r:embed="rId3"/>
+          <a:stretch>
+            <a:fillRect/>
+          </a:stretch>
+        </p:blipFill>
+        <p:spPr>
+          <a:xfrm>
+            <a:off x="908172" y="1045550"/>
+            <a:ext cx="10215154" cy="5191125"/>
+          </a:xfrm>
+          <a:prstGeom prst="rect">
+            <a:avLst/>
+          </a:prstGeom>
+        </p:spPr>
+      </p:pic>
+    </p:spTree>
+    <p:extLst>
+      <p:ext uri="{BB962C8B-B14F-4D97-AF65-F5344CB8AC3E}">
+        <p14:creationId xmlns:p14="http://schemas.microsoft.com/office/powerpoint/2010/main" val="1856932453"/>
+      </p:ext>
+    </p:extLst>
+  </p:cSld>
+  <p:clrMapOvr>
+    <a:masterClrMapping/>
+  </p:clrMapOvr>
+  <p:timing>
+    <p:tnLst>
+      <p:par>
+        <p:cTn id="1" dur="indefinite" restart="never" nodeType="tmRoot"/>
+      </p:par>
+    </p:tnLst>
+  </p:timing>
+</p:sld>
+</file>
+
+<file path=ppt/slides/slide63.xml><?xml version="1.0" encoding="utf-8"?>
+<p:sld xmlns:a="http://schemas.openxmlformats.org/drawingml/2006/main" xmlns:r="http://schemas.openxmlformats.org/officeDocument/2006/relationships" xmlns:p="http://schemas.openxmlformats.org/presentationml/2006/main">
+  <p:cSld>
+    <p:bg>
+      <p:bgPr>
+        <a:gradFill>
+          <a:gsLst>
+            <a:gs pos="0">
+              <a:schemeClr val="accent1">
+                <a:lumMod val="5000"/>
+                <a:lumOff val="95000"/>
+              </a:schemeClr>
+            </a:gs>
+            <a:gs pos="42000">
+              <a:schemeClr val="accent1">
+                <a:lumMod val="45000"/>
+                <a:lumOff val="55000"/>
+              </a:schemeClr>
+            </a:gs>
+            <a:gs pos="83000">
+              <a:schemeClr val="accent1">
+                <a:lumMod val="45000"/>
+                <a:lumOff val="55000"/>
+              </a:schemeClr>
+            </a:gs>
+            <a:gs pos="100000">
+              <a:schemeClr val="accent1">
+                <a:lumMod val="30000"/>
+                <a:lumOff val="70000"/>
+              </a:schemeClr>
+            </a:gs>
+          </a:gsLst>
+          <a:lin ang="5400000" scaled="1"/>
+        </a:gradFill>
+        <a:effectLst/>
+      </p:bgPr>
+    </p:bg>
+    <p:spTree>
+      <p:nvGrpSpPr>
+        <p:cNvPr id="1" name=""/>
+        <p:cNvGrpSpPr/>
+        <p:nvPr/>
+      </p:nvGrpSpPr>
+      <p:grpSpPr>
+        <a:xfrm>
+          <a:off x="0" y="0"/>
+          <a:ext cx="0" cy="0"/>
+          <a:chOff x="0" y="0"/>
+          <a:chExt cx="0" cy="0"/>
+        </a:xfrm>
+      </p:grpSpPr>
+      <p:sp>
+        <p:nvSpPr>
+          <p:cNvPr id="2" name="Title 1"/>
+          <p:cNvSpPr>
+            <a:spLocks noGrp="1"/>
+          </p:cNvSpPr>
+          <p:nvPr>
+            <p:ph type="title"/>
+          </p:nvPr>
+        </p:nvSpPr>
+        <p:spPr>
+          <a:xfrm>
+            <a:off x="312821" y="-164575"/>
+            <a:ext cx="10515600" cy="1325563"/>
+          </a:xfrm>
+        </p:spPr>
+        <p:txBody>
+          <a:bodyPr/>
+          <a:lstStyle/>
+          <a:p>
+            <a:r>
+              <a:rPr lang="en-US" dirty="0" smtClean="0"/>
+              <a:t>Global filters</a:t>
+            </a:r>
+            <a:endParaRPr lang="en-US" dirty="0"/>
+          </a:p>
+        </p:txBody>
+      </p:sp>
+      <p:pic>
+        <p:nvPicPr>
+          <p:cNvPr id="5" name="Picture 4"/>
+          <p:cNvPicPr>
+            <a:picLocks noChangeAspect="1"/>
+          </p:cNvPicPr>
+          <p:nvPr/>
+        </p:nvPicPr>
+        <p:blipFill>
+          <a:blip r:embed="rId3"/>
+          <a:stretch>
+            <a:fillRect/>
+          </a:stretch>
+        </p:blipFill>
+        <p:spPr>
+          <a:xfrm>
+            <a:off x="605897" y="1055481"/>
+            <a:ext cx="6381194" cy="3563411"/>
+          </a:xfrm>
+          <a:prstGeom prst="rect">
+            <a:avLst/>
+          </a:prstGeom>
+        </p:spPr>
+      </p:pic>
+      <p:pic>
+        <p:nvPicPr>
+          <p:cNvPr id="7" name="Picture 6"/>
+          <p:cNvPicPr>
+            <a:picLocks noChangeAspect="1"/>
+          </p:cNvPicPr>
+          <p:nvPr/>
+        </p:nvPicPr>
+        <p:blipFill>
+          <a:blip r:embed="rId4"/>
+          <a:stretch>
+            <a:fillRect/>
+          </a:stretch>
+        </p:blipFill>
+        <p:spPr>
+          <a:xfrm>
+            <a:off x="7117739" y="3001841"/>
+            <a:ext cx="4769462" cy="3588036"/>
+          </a:xfrm>
+          <a:prstGeom prst="rect">
+            <a:avLst/>
+          </a:prstGeom>
+        </p:spPr>
+      </p:pic>
+    </p:spTree>
+    <p:extLst>
+      <p:ext uri="{BB962C8B-B14F-4D97-AF65-F5344CB8AC3E}">
+        <p14:creationId xmlns:p14="http://schemas.microsoft.com/office/powerpoint/2010/main" val="92743986"/>
+      </p:ext>
+    </p:extLst>
+  </p:cSld>
+  <p:clrMapOvr>
+    <a:masterClrMapping/>
+  </p:clrMapOvr>
+  <p:timing>
+    <p:tnLst>
+      <p:par>
+        <p:cTn id="1" dur="indefinite" restart="never" nodeType="tmRoot"/>
+      </p:par>
+    </p:tnLst>
+  </p:timing>
+</p:sld>
+</file>
+
+<file path=ppt/slides/slide64.xml><?xml version="1.0" encoding="utf-8"?>
+<p:sld xmlns:a="http://schemas.openxmlformats.org/drawingml/2006/main" xmlns:r="http://schemas.openxmlformats.org/officeDocument/2006/relationships" xmlns:p="http://schemas.openxmlformats.org/presentationml/2006/main">
+  <p:cSld>
+    <p:bg>
+      <p:bgPr>
+        <a:gradFill>
+          <a:gsLst>
+            <a:gs pos="0">
+              <a:schemeClr val="accent1">
+                <a:lumMod val="5000"/>
+                <a:lumOff val="95000"/>
+              </a:schemeClr>
+            </a:gs>
+            <a:gs pos="42000">
+              <a:schemeClr val="accent1">
+                <a:lumMod val="45000"/>
+                <a:lumOff val="55000"/>
+              </a:schemeClr>
+            </a:gs>
+            <a:gs pos="83000">
+              <a:schemeClr val="accent1">
+                <a:lumMod val="45000"/>
+                <a:lumOff val="55000"/>
+              </a:schemeClr>
+            </a:gs>
+            <a:gs pos="100000">
+              <a:schemeClr val="accent1">
+                <a:lumMod val="30000"/>
+                <a:lumOff val="70000"/>
+              </a:schemeClr>
+            </a:gs>
+          </a:gsLst>
+          <a:lin ang="5400000" scaled="1"/>
+        </a:gradFill>
+        <a:effectLst/>
+      </p:bgPr>
+    </p:bg>
+    <p:spTree>
+      <p:nvGrpSpPr>
+        <p:cNvPr id="1" name=""/>
+        <p:cNvGrpSpPr/>
+        <p:nvPr/>
+      </p:nvGrpSpPr>
+      <p:grpSpPr>
+        <a:xfrm>
+          <a:off x="0" y="0"/>
+          <a:ext cx="0" cy="0"/>
+          <a:chOff x="0" y="0"/>
+          <a:chExt cx="0" cy="0"/>
+        </a:xfrm>
+      </p:grpSpPr>
+      <p:sp>
+        <p:nvSpPr>
+          <p:cNvPr id="2" name="Title 1"/>
+          <p:cNvSpPr>
+            <a:spLocks noGrp="1"/>
+          </p:cNvSpPr>
+          <p:nvPr>
+            <p:ph type="title"/>
+          </p:nvPr>
+        </p:nvSpPr>
+        <p:spPr>
+          <a:xfrm>
+            <a:off x="312821" y="-164575"/>
+            <a:ext cx="10515600" cy="1325563"/>
+          </a:xfrm>
+        </p:spPr>
+        <p:txBody>
+          <a:bodyPr/>
+          <a:lstStyle/>
+          <a:p>
+            <a:r>
+              <a:rPr lang="en-US" dirty="0" smtClean="0"/>
+              <a:t>Filter order</a:t>
+            </a:r>
+            <a:endParaRPr lang="en-US" dirty="0"/>
+          </a:p>
+        </p:txBody>
+      </p:sp>
+      <p:pic>
+        <p:nvPicPr>
+          <p:cNvPr id="4" name="Picture 3"/>
+          <p:cNvPicPr>
+            <a:picLocks noChangeAspect="1"/>
+          </p:cNvPicPr>
+          <p:nvPr/>
+        </p:nvPicPr>
+        <p:blipFill>
+          <a:blip r:embed="rId3"/>
+          <a:stretch>
+            <a:fillRect/>
+          </a:stretch>
+        </p:blipFill>
+        <p:spPr>
+          <a:xfrm>
+            <a:off x="1503850" y="788010"/>
+            <a:ext cx="9422058" cy="5902255"/>
+          </a:xfrm>
+          <a:prstGeom prst="rect">
+            <a:avLst/>
+          </a:prstGeom>
+        </p:spPr>
+      </p:pic>
+    </p:spTree>
+    <p:extLst>
+      <p:ext uri="{BB962C8B-B14F-4D97-AF65-F5344CB8AC3E}">
+        <p14:creationId xmlns:p14="http://schemas.microsoft.com/office/powerpoint/2010/main" val="3784476667"/>
+      </p:ext>
+    </p:extLst>
+  </p:cSld>
+  <p:clrMapOvr>
+    <a:masterClrMapping/>
+  </p:clrMapOvr>
+  <p:timing>
+    <p:tnLst>
+      <p:par>
+        <p:cTn id="1" dur="indefinite" restart="never" nodeType="tmRoot"/>
+      </p:par>
+    </p:tnLst>
+  </p:timing>
+</p:sld>
+</file>
+
+<file path=ppt/slides/slide65.xml><?xml version="1.0" encoding="utf-8"?>
+<p:sld xmlns:a="http://schemas.openxmlformats.org/drawingml/2006/main" xmlns:r="http://schemas.openxmlformats.org/officeDocument/2006/relationships" xmlns:p="http://schemas.openxmlformats.org/presentationml/2006/main">
+  <p:cSld>
+    <p:bg>
+      <p:bgPr>
+        <a:gradFill>
+          <a:gsLst>
+            <a:gs pos="0">
+              <a:schemeClr val="accent1">
+                <a:lumMod val="5000"/>
+                <a:lumOff val="95000"/>
+              </a:schemeClr>
+            </a:gs>
+            <a:gs pos="42000">
+              <a:schemeClr val="accent1">
+                <a:lumMod val="45000"/>
+                <a:lumOff val="55000"/>
+              </a:schemeClr>
+            </a:gs>
+            <a:gs pos="83000">
+              <a:schemeClr val="accent1">
+                <a:lumMod val="45000"/>
+                <a:lumOff val="55000"/>
+              </a:schemeClr>
+            </a:gs>
+            <a:gs pos="100000">
+              <a:schemeClr val="accent1">
+                <a:lumMod val="30000"/>
+                <a:lumOff val="70000"/>
+              </a:schemeClr>
+            </a:gs>
+          </a:gsLst>
+          <a:lin ang="5400000" scaled="1"/>
+        </a:gradFill>
+        <a:effectLst/>
+      </p:bgPr>
+    </p:bg>
+    <p:spTree>
+      <p:nvGrpSpPr>
+        <p:cNvPr id="1" name=""/>
+        <p:cNvGrpSpPr/>
+        <p:nvPr/>
+      </p:nvGrpSpPr>
+      <p:grpSpPr>
+        <a:xfrm>
+          <a:off x="0" y="0"/>
+          <a:ext cx="0" cy="0"/>
+          <a:chOff x="0" y="0"/>
+          <a:chExt cx="0" cy="0"/>
+        </a:xfrm>
+      </p:grpSpPr>
+      <p:sp>
+        <p:nvSpPr>
+          <p:cNvPr id="2" name="Title 1"/>
+          <p:cNvSpPr>
+            <a:spLocks noGrp="1"/>
+          </p:cNvSpPr>
+          <p:nvPr>
+            <p:ph type="title"/>
+          </p:nvPr>
+        </p:nvSpPr>
+        <p:spPr>
+          <a:xfrm>
+            <a:off x="312821" y="-164575"/>
+            <a:ext cx="10515600" cy="1325563"/>
+          </a:xfrm>
+        </p:spPr>
+        <p:txBody>
+          <a:bodyPr/>
+          <a:lstStyle/>
+          <a:p>
+            <a:r>
+              <a:rPr lang="en-US" dirty="0" smtClean="0"/>
+              <a:t>Filter order</a:t>
+            </a:r>
+            <a:endParaRPr lang="en-US" dirty="0"/>
+          </a:p>
+        </p:txBody>
+      </p:sp>
+      <p:pic>
+        <p:nvPicPr>
+          <p:cNvPr id="6" name="Picture 5"/>
+          <p:cNvPicPr>
+            <a:picLocks noChangeAspect="1"/>
+          </p:cNvPicPr>
+          <p:nvPr/>
+        </p:nvPicPr>
+        <p:blipFill>
+          <a:blip r:embed="rId3"/>
+          <a:stretch>
+            <a:fillRect/>
+          </a:stretch>
+        </p:blipFill>
+        <p:spPr>
+          <a:xfrm>
+            <a:off x="1266710" y="1278218"/>
+            <a:ext cx="9561711" cy="4873388"/>
+          </a:xfrm>
+          <a:prstGeom prst="rect">
+            <a:avLst/>
+          </a:prstGeom>
+        </p:spPr>
+      </p:pic>
+    </p:spTree>
+    <p:extLst>
+      <p:ext uri="{BB962C8B-B14F-4D97-AF65-F5344CB8AC3E}">
+        <p14:creationId xmlns:p14="http://schemas.microsoft.com/office/powerpoint/2010/main" val="3602742549"/>
+      </p:ext>
+    </p:extLst>
+  </p:cSld>
+  <p:clrMapOvr>
+    <a:masterClrMapping/>
+  </p:clrMapOvr>
+  <p:timing>
+    <p:tnLst>
+      <p:par>
+        <p:cTn id="1" dur="indefinite" restart="never" nodeType="tmRoot"/>
+      </p:par>
+    </p:tnLst>
+  </p:timing>
+</p:sld>
+</file>
+
+<file path=ppt/slides/slide66.xml><?xml version="1.0" encoding="utf-8"?>
+<p:sld xmlns:a="http://schemas.openxmlformats.org/drawingml/2006/main" xmlns:r="http://schemas.openxmlformats.org/officeDocument/2006/relationships" xmlns:p="http://schemas.openxmlformats.org/presentationml/2006/main">
+  <p:cSld>
+    <p:bg>
+      <p:bgPr>
+        <a:gradFill>
+          <a:gsLst>
+            <a:gs pos="0">
+              <a:schemeClr val="accent1">
+                <a:lumMod val="5000"/>
+                <a:lumOff val="95000"/>
+              </a:schemeClr>
+            </a:gs>
+            <a:gs pos="42000">
+              <a:schemeClr val="accent1">
+                <a:lumMod val="45000"/>
+                <a:lumOff val="55000"/>
+              </a:schemeClr>
+            </a:gs>
+            <a:gs pos="83000">
+              <a:schemeClr val="accent1">
+                <a:lumMod val="45000"/>
+                <a:lumOff val="55000"/>
+              </a:schemeClr>
+            </a:gs>
+            <a:gs pos="100000">
+              <a:schemeClr val="accent1">
+                <a:lumMod val="30000"/>
+                <a:lumOff val="70000"/>
+              </a:schemeClr>
+            </a:gs>
+          </a:gsLst>
+          <a:lin ang="5400000" scaled="1"/>
+        </a:gradFill>
+        <a:effectLst/>
+      </p:bgPr>
+    </p:bg>
+    <p:spTree>
+      <p:nvGrpSpPr>
+        <p:cNvPr id="1" name=""/>
+        <p:cNvGrpSpPr/>
+        <p:nvPr/>
+      </p:nvGrpSpPr>
+      <p:grpSpPr>
+        <a:xfrm>
+          <a:off x="0" y="0"/>
+          <a:ext cx="0" cy="0"/>
+          <a:chOff x="0" y="0"/>
+          <a:chExt cx="0" cy="0"/>
+        </a:xfrm>
+      </p:grpSpPr>
+      <p:sp>
+        <p:nvSpPr>
+          <p:cNvPr id="2" name="Title 1"/>
+          <p:cNvSpPr>
+            <a:spLocks noGrp="1"/>
+          </p:cNvSpPr>
+          <p:nvPr>
+            <p:ph type="title"/>
+          </p:nvPr>
+        </p:nvSpPr>
+        <p:spPr>
+          <a:xfrm>
+            <a:off x="312821" y="-164575"/>
+            <a:ext cx="10515600" cy="1325563"/>
+          </a:xfrm>
+        </p:spPr>
+        <p:txBody>
+          <a:bodyPr/>
+          <a:lstStyle/>
+          <a:p>
+            <a:r>
+              <a:rPr lang="en-US" dirty="0" smtClean="0"/>
+              <a:t>Filter order</a:t>
+            </a:r>
+            <a:endParaRPr lang="en-US" dirty="0"/>
+          </a:p>
+        </p:txBody>
+      </p:sp>
+      <p:pic>
+        <p:nvPicPr>
+          <p:cNvPr id="5" name="Picture 4"/>
+          <p:cNvPicPr>
+            <a:picLocks noChangeAspect="1"/>
+          </p:cNvPicPr>
+          <p:nvPr/>
+        </p:nvPicPr>
+        <p:blipFill>
+          <a:blip r:embed="rId3"/>
+          <a:stretch>
+            <a:fillRect/>
+          </a:stretch>
+        </p:blipFill>
+        <p:spPr>
+          <a:xfrm>
+            <a:off x="473160" y="1667608"/>
+            <a:ext cx="10194922" cy="4053254"/>
+          </a:xfrm>
+          <a:prstGeom prst="rect">
+            <a:avLst/>
+          </a:prstGeom>
+        </p:spPr>
+      </p:pic>
+    </p:spTree>
+    <p:extLst>
+      <p:ext uri="{BB962C8B-B14F-4D97-AF65-F5344CB8AC3E}">
+        <p14:creationId xmlns:p14="http://schemas.microsoft.com/office/powerpoint/2010/main" val="4011733776"/>
+      </p:ext>
+    </p:extLst>
+  </p:cSld>
+  <p:clrMapOvr>
+    <a:masterClrMapping/>
+  </p:clrMapOvr>
+  <p:timing>
+    <p:tnLst>
+      <p:par>
+        <p:cTn id="1" dur="indefinite" restart="never" nodeType="tmRoot"/>
+      </p:par>
+    </p:tnLst>
+  </p:timing>
+</p:sld>
+</file>
+
+<file path=ppt/slides/slide67.xml><?xml version="1.0" encoding="utf-8"?>
+<p:sld xmlns:a="http://schemas.openxmlformats.org/drawingml/2006/main" xmlns:r="http://schemas.openxmlformats.org/officeDocument/2006/relationships" xmlns:p="http://schemas.openxmlformats.org/presentationml/2006/main">
+  <p:cSld>
+    <p:bg>
+      <p:bgPr>
+        <a:gradFill>
+          <a:gsLst>
+            <a:gs pos="0">
+              <a:schemeClr val="accent1">
+                <a:lumMod val="5000"/>
+                <a:lumOff val="95000"/>
+              </a:schemeClr>
+            </a:gs>
+            <a:gs pos="42000">
+              <a:schemeClr val="accent1">
+                <a:lumMod val="45000"/>
+                <a:lumOff val="55000"/>
+              </a:schemeClr>
+            </a:gs>
+            <a:gs pos="83000">
+              <a:schemeClr val="accent1">
+                <a:lumMod val="45000"/>
+                <a:lumOff val="55000"/>
+              </a:schemeClr>
+            </a:gs>
+            <a:gs pos="100000">
+              <a:schemeClr val="accent1">
+                <a:lumMod val="30000"/>
+                <a:lumOff val="70000"/>
+              </a:schemeClr>
+            </a:gs>
+          </a:gsLst>
+          <a:lin ang="5400000" scaled="1"/>
+        </a:gradFill>
+        <a:effectLst/>
+      </p:bgPr>
+    </p:bg>
+    <p:spTree>
+      <p:nvGrpSpPr>
+        <p:cNvPr id="1" name=""/>
+        <p:cNvGrpSpPr/>
+        <p:nvPr/>
+      </p:nvGrpSpPr>
+      <p:grpSpPr>
+        <a:xfrm>
+          <a:off x="0" y="0"/>
+          <a:ext cx="0" cy="0"/>
+          <a:chOff x="0" y="0"/>
+          <a:chExt cx="0" cy="0"/>
+        </a:xfrm>
+      </p:grpSpPr>
+      <p:sp>
+        <p:nvSpPr>
+          <p:cNvPr id="2" name="Title 1"/>
+          <p:cNvSpPr>
+            <a:spLocks noGrp="1"/>
+          </p:cNvSpPr>
+          <p:nvPr>
+            <p:ph type="title"/>
+          </p:nvPr>
+        </p:nvSpPr>
+        <p:spPr>
+          <a:xfrm>
+            <a:off x="312821" y="-164575"/>
+            <a:ext cx="10515600" cy="1325563"/>
+          </a:xfrm>
+        </p:spPr>
+        <p:txBody>
+          <a:bodyPr/>
+          <a:lstStyle/>
+          <a:p>
+            <a:r>
+              <a:rPr lang="en-US" dirty="0" smtClean="0"/>
+              <a:t>Filter order</a:t>
+            </a:r>
+            <a:endParaRPr lang="en-US" dirty="0"/>
+          </a:p>
+        </p:txBody>
+      </p:sp>
+      <p:pic>
+        <p:nvPicPr>
+          <p:cNvPr id="3" name="Picture 2"/>
+          <p:cNvPicPr>
+            <a:picLocks noChangeAspect="1"/>
+          </p:cNvPicPr>
+          <p:nvPr/>
+        </p:nvPicPr>
+        <p:blipFill>
+          <a:blip r:embed="rId3"/>
+          <a:stretch>
+            <a:fillRect/>
+          </a:stretch>
+        </p:blipFill>
+        <p:spPr>
+          <a:xfrm>
+            <a:off x="862761" y="1032035"/>
+            <a:ext cx="9415720" cy="5403935"/>
+          </a:xfrm>
+          <a:prstGeom prst="rect">
+            <a:avLst/>
+          </a:prstGeom>
+        </p:spPr>
+      </p:pic>
+    </p:spTree>
+    <p:extLst>
+      <p:ext uri="{BB962C8B-B14F-4D97-AF65-F5344CB8AC3E}">
+        <p14:creationId xmlns:p14="http://schemas.microsoft.com/office/powerpoint/2010/main" val="1710566266"/>
+      </p:ext>
+    </p:extLst>
+  </p:cSld>
+  <p:clrMapOvr>
+    <a:masterClrMapping/>
+  </p:clrMapOvr>
+  <p:timing>
+    <p:tnLst>
+      <p:par>
+        <p:cTn id="1" dur="indefinite" restart="never" nodeType="tmRoot"/>
+      </p:par>
+    </p:tnLst>
+  </p:timing>
+</p:sld>
+</file>
+
+<file path=ppt/slides/slide68.xml><?xml version="1.0" encoding="utf-8"?>
+<p:sld xmlns:a="http://schemas.openxmlformats.org/drawingml/2006/main" xmlns:r="http://schemas.openxmlformats.org/officeDocument/2006/relationships" xmlns:p="http://schemas.openxmlformats.org/presentationml/2006/main">
+  <p:cSld>
+    <p:bg>
+      <p:bgPr>
+        <a:gradFill>
+          <a:gsLst>
+            <a:gs pos="0">
+              <a:schemeClr val="accent1">
+                <a:lumMod val="5000"/>
+                <a:lumOff val="95000"/>
+              </a:schemeClr>
+            </a:gs>
+            <a:gs pos="42000">
+              <a:schemeClr val="accent1">
+                <a:lumMod val="45000"/>
+                <a:lumOff val="55000"/>
+              </a:schemeClr>
+            </a:gs>
+            <a:gs pos="83000">
+              <a:schemeClr val="accent1">
+                <a:lumMod val="45000"/>
+                <a:lumOff val="55000"/>
+              </a:schemeClr>
+            </a:gs>
+            <a:gs pos="100000">
+              <a:schemeClr val="accent1">
+                <a:lumMod val="30000"/>
+                <a:lumOff val="70000"/>
+              </a:schemeClr>
+            </a:gs>
+          </a:gsLst>
+          <a:lin ang="5400000" scaled="1"/>
+        </a:gradFill>
+        <a:effectLst/>
+      </p:bgPr>
+    </p:bg>
+    <p:spTree>
+      <p:nvGrpSpPr>
+        <p:cNvPr id="1" name=""/>
+        <p:cNvGrpSpPr/>
+        <p:nvPr/>
+      </p:nvGrpSpPr>
+      <p:grpSpPr>
+        <a:xfrm>
+          <a:off x="0" y="0"/>
+          <a:ext cx="0" cy="0"/>
+          <a:chOff x="0" y="0"/>
+          <a:chExt cx="0" cy="0"/>
+        </a:xfrm>
+      </p:grpSpPr>
+      <p:sp>
+        <p:nvSpPr>
+          <p:cNvPr id="2" name="Title 1"/>
+          <p:cNvSpPr>
+            <a:spLocks noGrp="1"/>
+          </p:cNvSpPr>
+          <p:nvPr>
+            <p:ph type="title"/>
+          </p:nvPr>
+        </p:nvSpPr>
+        <p:spPr>
+          <a:xfrm>
+            <a:off x="312821" y="-164575"/>
+            <a:ext cx="10515600" cy="1325563"/>
+          </a:xfrm>
+        </p:spPr>
+        <p:txBody>
+          <a:bodyPr/>
+          <a:lstStyle/>
+          <a:p>
+            <a:r>
+              <a:rPr lang="en-US" dirty="0" smtClean="0"/>
+              <a:t>Changing filter order</a:t>
+            </a:r>
+            <a:endParaRPr lang="en-US" dirty="0"/>
+          </a:p>
+        </p:txBody>
+      </p:sp>
+      <p:sp>
+        <p:nvSpPr>
+          <p:cNvPr id="4" name="TextBox 3"/>
+          <p:cNvSpPr txBox="1"/>
+          <p:nvPr/>
+        </p:nvSpPr>
+        <p:spPr>
+          <a:xfrm>
+            <a:off x="855784" y="1992923"/>
+            <a:ext cx="10703169" cy="3108543"/>
+          </a:xfrm>
+          <a:prstGeom prst="rect">
+            <a:avLst/>
+          </a:prstGeom>
+          <a:noFill/>
+        </p:spPr>
+        <p:txBody>
+          <a:bodyPr wrap="square" rtlCol="0">
+            <a:spAutoFit/>
+          </a:bodyPr>
+          <a:lstStyle/>
+          <a:p>
+            <a:r>
+              <a:rPr lang="en-US" sz="2800" dirty="0">
+                <a:latin typeface="Consolas" panose="020B0609020204030204" pitchFamily="49" charset="0"/>
+              </a:rPr>
+              <a:t>namespace </a:t>
+            </a:r>
+            <a:r>
+              <a:rPr lang="en-US" sz="2800" dirty="0" err="1">
+                <a:latin typeface="Consolas" panose="020B0609020204030204" pitchFamily="49" charset="0"/>
+              </a:rPr>
+              <a:t>Microsoft.AspNetCore.Mvc.Filters</a:t>
+            </a:r>
+            <a:r>
+              <a:rPr lang="en-US" sz="2800" dirty="0">
+                <a:latin typeface="Consolas" panose="020B0609020204030204" pitchFamily="49" charset="0"/>
+              </a:rPr>
+              <a:t> </a:t>
+            </a:r>
+            <a:r>
+              <a:rPr lang="en-US" sz="2800" dirty="0" smtClean="0">
+                <a:latin typeface="Consolas" panose="020B0609020204030204" pitchFamily="49" charset="0"/>
+              </a:rPr>
+              <a:t>{</a:t>
+            </a:r>
+          </a:p>
+          <a:p>
+            <a:endParaRPr lang="en-US" sz="2800" dirty="0">
+              <a:latin typeface="Consolas" panose="020B0609020204030204" pitchFamily="49" charset="0"/>
+            </a:endParaRPr>
+          </a:p>
+          <a:p>
+            <a:r>
+              <a:rPr lang="en-US" sz="2800" dirty="0" smtClean="0">
+                <a:latin typeface="Consolas" panose="020B0609020204030204" pitchFamily="49" charset="0"/>
+              </a:rPr>
+              <a:t>	public </a:t>
+            </a:r>
+            <a:r>
+              <a:rPr lang="en-US" sz="2800" dirty="0">
+                <a:latin typeface="Consolas" panose="020B0609020204030204" pitchFamily="49" charset="0"/>
+              </a:rPr>
+              <a:t>interface </a:t>
+            </a:r>
+            <a:r>
+              <a:rPr lang="en-US" sz="2800" dirty="0" err="1">
+                <a:latin typeface="Consolas" panose="020B0609020204030204" pitchFamily="49" charset="0"/>
+              </a:rPr>
+              <a:t>IOrderedFilter</a:t>
+            </a:r>
+            <a:r>
+              <a:rPr lang="en-US" sz="2800" dirty="0">
+                <a:latin typeface="Consolas" panose="020B0609020204030204" pitchFamily="49" charset="0"/>
+              </a:rPr>
+              <a:t> : </a:t>
+            </a:r>
+            <a:r>
+              <a:rPr lang="en-US" sz="2800" dirty="0" err="1">
+                <a:latin typeface="Consolas" panose="020B0609020204030204" pitchFamily="49" charset="0"/>
+              </a:rPr>
+              <a:t>IFilterMetadata</a:t>
+            </a:r>
+            <a:r>
+              <a:rPr lang="en-US" sz="2800" dirty="0">
+                <a:latin typeface="Consolas" panose="020B0609020204030204" pitchFamily="49" charset="0"/>
+              </a:rPr>
+              <a:t> </a:t>
+            </a:r>
+            <a:endParaRPr lang="en-US" sz="2800" dirty="0" smtClean="0">
+              <a:latin typeface="Consolas" panose="020B0609020204030204" pitchFamily="49" charset="0"/>
+            </a:endParaRPr>
+          </a:p>
+          <a:p>
+            <a:r>
+              <a:rPr lang="en-US" sz="2800" dirty="0" smtClean="0">
+                <a:latin typeface="Consolas" panose="020B0609020204030204" pitchFamily="49" charset="0"/>
+              </a:rPr>
+              <a:t>	{</a:t>
+            </a:r>
+            <a:endParaRPr lang="en-US" sz="2800" dirty="0">
+              <a:latin typeface="Consolas" panose="020B0609020204030204" pitchFamily="49" charset="0"/>
+            </a:endParaRPr>
+          </a:p>
+          <a:p>
+            <a:r>
+              <a:rPr lang="en-US" sz="2800" dirty="0" smtClean="0">
+                <a:latin typeface="Consolas" panose="020B0609020204030204" pitchFamily="49" charset="0"/>
+              </a:rPr>
+              <a:t>		</a:t>
+            </a:r>
+            <a:r>
+              <a:rPr lang="en-US" sz="2800" dirty="0" err="1" smtClean="0">
+                <a:latin typeface="Consolas" panose="020B0609020204030204" pitchFamily="49" charset="0"/>
+              </a:rPr>
+              <a:t>int</a:t>
+            </a:r>
+            <a:r>
+              <a:rPr lang="en-US" sz="2800" dirty="0" smtClean="0">
+                <a:latin typeface="Consolas" panose="020B0609020204030204" pitchFamily="49" charset="0"/>
+              </a:rPr>
+              <a:t> </a:t>
+            </a:r>
+            <a:r>
+              <a:rPr lang="en-US" sz="2800" dirty="0">
+                <a:latin typeface="Consolas" panose="020B0609020204030204" pitchFamily="49" charset="0"/>
+              </a:rPr>
+              <a:t>Order { get; }</a:t>
+            </a:r>
+          </a:p>
+          <a:p>
+            <a:r>
+              <a:rPr lang="en-US" sz="2800" dirty="0" smtClean="0">
+                <a:latin typeface="Consolas" panose="020B0609020204030204" pitchFamily="49" charset="0"/>
+              </a:rPr>
+              <a:t>	}</a:t>
+            </a:r>
+            <a:endParaRPr lang="en-US" sz="2800" dirty="0">
+              <a:latin typeface="Consolas" panose="020B0609020204030204" pitchFamily="49" charset="0"/>
+            </a:endParaRPr>
+          </a:p>
+          <a:p>
+            <a:r>
+              <a:rPr lang="en-US" sz="2800" dirty="0">
+                <a:latin typeface="Consolas" panose="020B0609020204030204" pitchFamily="49" charset="0"/>
+              </a:rPr>
+              <a:t>}</a:t>
+            </a:r>
+            <a:endParaRPr lang="en-US" sz="2800" dirty="0">
+              <a:latin typeface="Consolas" panose="020B0609020204030204" pitchFamily="49" charset="0"/>
+            </a:endParaRPr>
+          </a:p>
+        </p:txBody>
+      </p:sp>
+    </p:spTree>
+    <p:extLst>
+      <p:ext uri="{BB962C8B-B14F-4D97-AF65-F5344CB8AC3E}">
+        <p14:creationId xmlns:p14="http://schemas.microsoft.com/office/powerpoint/2010/main" val="434304318"/>
+      </p:ext>
+    </p:extLst>
+  </p:cSld>
+  <p:clrMapOvr>
+    <a:masterClrMapping/>
+  </p:clrMapOvr>
+  <p:timing>
+    <p:tnLst>
+      <p:par>
+        <p:cTn id="1" dur="indefinite" restart="never" nodeType="tmRoot"/>
+      </p:par>
+    </p:tnLst>
+  </p:timing>
+</p:sld>
+</file>
+
+<file path=ppt/slides/slide69.xml><?xml version="1.0" encoding="utf-8"?>
+<p:sld xmlns:a="http://schemas.openxmlformats.org/drawingml/2006/main" xmlns:r="http://schemas.openxmlformats.org/officeDocument/2006/relationships" xmlns:p="http://schemas.openxmlformats.org/presentationml/2006/main">
+  <p:cSld>
+    <p:bg>
+      <p:bgPr>
+        <a:gradFill>
+          <a:gsLst>
+            <a:gs pos="0">
+              <a:schemeClr val="accent1">
+                <a:lumMod val="5000"/>
+                <a:lumOff val="95000"/>
+              </a:schemeClr>
+            </a:gs>
+            <a:gs pos="42000">
+              <a:schemeClr val="accent1">
+                <a:lumMod val="45000"/>
+                <a:lumOff val="55000"/>
+              </a:schemeClr>
+            </a:gs>
+            <a:gs pos="83000">
+              <a:schemeClr val="accent1">
+                <a:lumMod val="45000"/>
+                <a:lumOff val="55000"/>
+              </a:schemeClr>
+            </a:gs>
+            <a:gs pos="100000">
+              <a:schemeClr val="accent1">
+                <a:lumMod val="30000"/>
+                <a:lumOff val="70000"/>
+              </a:schemeClr>
+            </a:gs>
+          </a:gsLst>
+          <a:lin ang="5400000" scaled="1"/>
+        </a:gradFill>
+        <a:effectLst/>
+      </p:bgPr>
+    </p:bg>
+    <p:spTree>
+      <p:nvGrpSpPr>
+        <p:cNvPr id="1" name=""/>
+        <p:cNvGrpSpPr/>
+        <p:nvPr/>
+      </p:nvGrpSpPr>
+      <p:grpSpPr>
+        <a:xfrm>
+          <a:off x="0" y="0"/>
+          <a:ext cx="0" cy="0"/>
+          <a:chOff x="0" y="0"/>
+          <a:chExt cx="0" cy="0"/>
+        </a:xfrm>
+      </p:grpSpPr>
+      <p:sp>
+        <p:nvSpPr>
+          <p:cNvPr id="2" name="Title 1"/>
+          <p:cNvSpPr>
+            <a:spLocks noGrp="1"/>
+          </p:cNvSpPr>
+          <p:nvPr>
+            <p:ph type="title"/>
+          </p:nvPr>
+        </p:nvSpPr>
+        <p:spPr>
+          <a:xfrm>
+            <a:off x="312821" y="-164575"/>
+            <a:ext cx="10515600" cy="1325563"/>
+          </a:xfrm>
+        </p:spPr>
+        <p:txBody>
+          <a:bodyPr/>
+          <a:lstStyle/>
+          <a:p>
+            <a:r>
+              <a:rPr lang="en-US" dirty="0" smtClean="0"/>
+              <a:t>Changing filter order</a:t>
+            </a:r>
+            <a:endParaRPr lang="en-US" dirty="0"/>
+          </a:p>
+        </p:txBody>
+      </p:sp>
+      <p:pic>
+        <p:nvPicPr>
+          <p:cNvPr id="3" name="Picture 2"/>
+          <p:cNvPicPr>
+            <a:picLocks noChangeAspect="1"/>
+          </p:cNvPicPr>
+          <p:nvPr/>
+        </p:nvPicPr>
+        <p:blipFill>
+          <a:blip r:embed="rId3"/>
+          <a:stretch>
+            <a:fillRect/>
+          </a:stretch>
+        </p:blipFill>
+        <p:spPr>
+          <a:xfrm>
+            <a:off x="312821" y="1782640"/>
+            <a:ext cx="11345262" cy="3328621"/>
+          </a:xfrm>
+          <a:prstGeom prst="rect">
+            <a:avLst/>
+          </a:prstGeom>
+        </p:spPr>
+      </p:pic>
+    </p:spTree>
+    <p:extLst>
+      <p:ext uri="{BB962C8B-B14F-4D97-AF65-F5344CB8AC3E}">
+        <p14:creationId xmlns:p14="http://schemas.microsoft.com/office/powerpoint/2010/main" val="2685937806"/>
+      </p:ext>
+    </p:extLst>
+  </p:cSld>
+  <p:clrMapOvr>
+    <a:masterClrMapping/>
+  </p:clrMapOvr>
+  <p:timing>
+    <p:tnLst>
+      <p:par>
+        <p:cTn id="1" dur="indefinite" restart="never" nodeType="tmRoot"/>
+      </p:par>
+    </p:tnLst>
+  </p:timing>
+</p:sld>
+</file>
+
 <file path=ppt/slides/slide7.xml><?xml version="1.0" encoding="utf-8"?>
 <p:sld xmlns:a="http://schemas.openxmlformats.org/drawingml/2006/main" xmlns:r="http://schemas.openxmlformats.org/officeDocument/2006/relationships" xmlns:p="http://schemas.openxmlformats.org/presentationml/2006/main">
   <p:cSld>
@@ -15888,6 +17902,301 @@
     <p:extLst>
       <p:ext uri="{BB962C8B-B14F-4D97-AF65-F5344CB8AC3E}">
         <p14:creationId xmlns:p14="http://schemas.microsoft.com/office/powerpoint/2010/main" val="1312923511"/>
+      </p:ext>
+    </p:extLst>
+  </p:cSld>
+  <p:clrMapOvr>
+    <a:masterClrMapping/>
+  </p:clrMapOvr>
+  <p:timing>
+    <p:tnLst>
+      <p:par>
+        <p:cTn id="1" dur="indefinite" restart="never" nodeType="tmRoot"/>
+      </p:par>
+    </p:tnLst>
+  </p:timing>
+</p:sld>
+</file>
+
+<file path=ppt/slides/slide70.xml><?xml version="1.0" encoding="utf-8"?>
+<p:sld xmlns:a="http://schemas.openxmlformats.org/drawingml/2006/main" xmlns:r="http://schemas.openxmlformats.org/officeDocument/2006/relationships" xmlns:p="http://schemas.openxmlformats.org/presentationml/2006/main">
+  <p:cSld>
+    <p:bg>
+      <p:bgPr>
+        <a:gradFill>
+          <a:gsLst>
+            <a:gs pos="0">
+              <a:schemeClr val="accent1">
+                <a:lumMod val="5000"/>
+                <a:lumOff val="95000"/>
+              </a:schemeClr>
+            </a:gs>
+            <a:gs pos="42000">
+              <a:schemeClr val="accent1">
+                <a:lumMod val="45000"/>
+                <a:lumOff val="55000"/>
+              </a:schemeClr>
+            </a:gs>
+            <a:gs pos="83000">
+              <a:schemeClr val="accent1">
+                <a:lumMod val="45000"/>
+                <a:lumOff val="55000"/>
+              </a:schemeClr>
+            </a:gs>
+            <a:gs pos="100000">
+              <a:schemeClr val="accent1">
+                <a:lumMod val="30000"/>
+                <a:lumOff val="70000"/>
+              </a:schemeClr>
+            </a:gs>
+          </a:gsLst>
+          <a:lin ang="5400000" scaled="1"/>
+        </a:gradFill>
+        <a:effectLst/>
+      </p:bgPr>
+    </p:bg>
+    <p:spTree>
+      <p:nvGrpSpPr>
+        <p:cNvPr id="1" name=""/>
+        <p:cNvGrpSpPr/>
+        <p:nvPr/>
+      </p:nvGrpSpPr>
+      <p:grpSpPr>
+        <a:xfrm>
+          <a:off x="0" y="0"/>
+          <a:ext cx="0" cy="0"/>
+          <a:chOff x="0" y="0"/>
+          <a:chExt cx="0" cy="0"/>
+        </a:xfrm>
+      </p:grpSpPr>
+      <p:sp>
+        <p:nvSpPr>
+          <p:cNvPr id="2" name="Title 1"/>
+          <p:cNvSpPr>
+            <a:spLocks noGrp="1"/>
+          </p:cNvSpPr>
+          <p:nvPr>
+            <p:ph type="title"/>
+          </p:nvPr>
+        </p:nvSpPr>
+        <p:spPr>
+          <a:xfrm>
+            <a:off x="312821" y="-164575"/>
+            <a:ext cx="10515600" cy="1325563"/>
+          </a:xfrm>
+        </p:spPr>
+        <p:txBody>
+          <a:bodyPr/>
+          <a:lstStyle/>
+          <a:p>
+            <a:r>
+              <a:rPr lang="en-US" dirty="0" smtClean="0"/>
+              <a:t>Changing filter order</a:t>
+            </a:r>
+            <a:endParaRPr lang="en-US" dirty="0"/>
+          </a:p>
+        </p:txBody>
+      </p:sp>
+      <p:pic>
+        <p:nvPicPr>
+          <p:cNvPr id="4" name="Picture 3"/>
+          <p:cNvPicPr>
+            <a:picLocks noChangeAspect="1"/>
+          </p:cNvPicPr>
+          <p:nvPr/>
+        </p:nvPicPr>
+        <p:blipFill>
+          <a:blip r:embed="rId3"/>
+          <a:stretch>
+            <a:fillRect/>
+          </a:stretch>
+        </p:blipFill>
+        <p:spPr>
+          <a:xfrm>
+            <a:off x="1065335" y="912933"/>
+            <a:ext cx="9977804" cy="5656207"/>
+          </a:xfrm>
+          <a:prstGeom prst="rect">
+            <a:avLst/>
+          </a:prstGeom>
+        </p:spPr>
+      </p:pic>
+    </p:spTree>
+    <p:extLst>
+      <p:ext uri="{BB962C8B-B14F-4D97-AF65-F5344CB8AC3E}">
+        <p14:creationId xmlns:p14="http://schemas.microsoft.com/office/powerpoint/2010/main" val="3261299170"/>
+      </p:ext>
+    </p:extLst>
+  </p:cSld>
+  <p:clrMapOvr>
+    <a:masterClrMapping/>
+  </p:clrMapOvr>
+  <p:timing>
+    <p:tnLst>
+      <p:par>
+        <p:cTn id="1" dur="indefinite" restart="never" nodeType="tmRoot"/>
+      </p:par>
+    </p:tnLst>
+  </p:timing>
+</p:sld>
+</file>
+
+<file path=ppt/slides/slide71.xml><?xml version="1.0" encoding="utf-8"?>
+<p:sld xmlns:a="http://schemas.openxmlformats.org/drawingml/2006/main" xmlns:r="http://schemas.openxmlformats.org/officeDocument/2006/relationships" xmlns:p="http://schemas.openxmlformats.org/presentationml/2006/main">
+  <p:cSld>
+    <p:bg>
+      <p:bgPr>
+        <a:gradFill>
+          <a:gsLst>
+            <a:gs pos="0">
+              <a:schemeClr val="accent1">
+                <a:lumMod val="5000"/>
+                <a:lumOff val="95000"/>
+              </a:schemeClr>
+            </a:gs>
+            <a:gs pos="42000">
+              <a:schemeClr val="accent1">
+                <a:lumMod val="45000"/>
+                <a:lumOff val="55000"/>
+              </a:schemeClr>
+            </a:gs>
+            <a:gs pos="83000">
+              <a:schemeClr val="accent1">
+                <a:lumMod val="45000"/>
+                <a:lumOff val="55000"/>
+              </a:schemeClr>
+            </a:gs>
+            <a:gs pos="100000">
+              <a:schemeClr val="accent1">
+                <a:lumMod val="30000"/>
+                <a:lumOff val="70000"/>
+              </a:schemeClr>
+            </a:gs>
+          </a:gsLst>
+          <a:lin ang="5400000" scaled="1"/>
+        </a:gradFill>
+        <a:effectLst/>
+      </p:bgPr>
+    </p:bg>
+    <p:spTree>
+      <p:nvGrpSpPr>
+        <p:cNvPr id="1" name=""/>
+        <p:cNvGrpSpPr/>
+        <p:nvPr/>
+      </p:nvGrpSpPr>
+      <p:grpSpPr>
+        <a:xfrm>
+          <a:off x="0" y="0"/>
+          <a:ext cx="0" cy="0"/>
+          <a:chOff x="0" y="0"/>
+          <a:chExt cx="0" cy="0"/>
+        </a:xfrm>
+      </p:grpSpPr>
+      <p:sp>
+        <p:nvSpPr>
+          <p:cNvPr id="2" name="Title 1"/>
+          <p:cNvSpPr>
+            <a:spLocks noGrp="1"/>
+          </p:cNvSpPr>
+          <p:nvPr>
+            <p:ph type="title"/>
+          </p:nvPr>
+        </p:nvSpPr>
+        <p:spPr>
+          <a:xfrm>
+            <a:off x="723130" y="784994"/>
+            <a:ext cx="10515600" cy="4689683"/>
+          </a:xfrm>
+        </p:spPr>
+        <p:txBody>
+          <a:bodyPr>
+            <a:normAutofit/>
+          </a:bodyPr>
+          <a:lstStyle/>
+          <a:p>
+            <a:pPr algn="ctr"/>
+            <a:r>
+              <a:rPr lang="en-US" dirty="0" smtClean="0"/>
+              <a:t>Thanks for attention</a:t>
+            </a:r>
+            <a:br>
+              <a:rPr lang="en-US" dirty="0" smtClean="0"/>
+            </a:br>
+            <a:r>
+              <a:rPr lang="en-US" dirty="0"/>
+              <a:t/>
+            </a:r>
+            <a:br>
+              <a:rPr lang="en-US" dirty="0"/>
+            </a:br>
+            <a:r>
+              <a:rPr lang="en-US" dirty="0" smtClean="0"/>
+              <a:t>Evgeniy </a:t>
+            </a:r>
+            <a:r>
+              <a:rPr lang="en-US" dirty="0" err="1" smtClean="0"/>
+              <a:t>Pilyaev</a:t>
+            </a:r>
+            <a:r>
+              <a:rPr lang="en-US" dirty="0" smtClean="0"/>
+              <a:t/>
+            </a:r>
+            <a:br>
+              <a:rPr lang="en-US" dirty="0" smtClean="0"/>
+            </a:br>
+            <a:r>
+              <a:rPr lang="en-US" dirty="0" smtClean="0"/>
+              <a:t/>
+            </a:r>
+            <a:br>
+              <a:rPr lang="en-US" dirty="0" smtClean="0"/>
+            </a:br>
+            <a:r>
+              <a:rPr lang="en-US" dirty="0">
+                <a:hlinkClick r:id="rId3"/>
+              </a:rPr>
+              <a:t>https://</a:t>
+            </a:r>
+            <a:r>
+              <a:rPr lang="en-US" dirty="0" smtClean="0">
+                <a:hlinkClick r:id="rId3"/>
+              </a:rPr>
+              <a:t>github.com/EPilyaev/ASPNetCoreMVC</a:t>
+            </a:r>
+            <a:r>
+              <a:rPr lang="en-US" dirty="0" smtClean="0"/>
+              <a:t/>
+            </a:r>
+            <a:br>
+              <a:rPr lang="en-US" dirty="0" smtClean="0"/>
+            </a:br>
+            <a:r>
+              <a:rPr lang="en-US" dirty="0" smtClean="0"/>
+              <a:t/>
+            </a:r>
+            <a:br>
+              <a:rPr lang="en-US" dirty="0" smtClean="0"/>
+            </a:br>
+            <a:r>
+              <a:rPr lang="en-US" dirty="0" smtClean="0"/>
+              <a:t>(</a:t>
+            </a:r>
+            <a:r>
+              <a:rPr lang="en-US" dirty="0" err="1" smtClean="0"/>
+              <a:t>Middleware&amp;Filters</a:t>
+            </a:r>
+            <a:r>
+              <a:rPr lang="en-US" dirty="0" smtClean="0"/>
+              <a:t> presentation)</a:t>
+            </a:r>
+            <a:endParaRPr lang="en-US" dirty="0"/>
+          </a:p>
+        </p:txBody>
+      </p:sp>
+    </p:spTree>
+    <p:extLst>
+      <p:ext uri="{BB962C8B-B14F-4D97-AF65-F5344CB8AC3E}">
+        <p14:creationId xmlns:p14="http://schemas.microsoft.com/office/powerpoint/2010/main" val="979259589"/>
       </p:ext>
     </p:extLst>
   </p:cSld>

</xml_diff>